<commit_message>
Update EDSB Intermediary Presentation.pptx
</commit_message>
<xml_diff>
--- a/3. Presentation/EDSB Intermediary Presentation.pptx
+++ b/3. Presentation/EDSB Intermediary Presentation.pptx
@@ -128,32 +128,23 @@
 </p:presentation>
 </file>
 
-<file path=ppt/revisionInfo.xml><?xml version="1.0" encoding="utf-8"?>
-<p1510:revInfo xmlns:a="http://schemas.openxmlformats.org/drawingml/2006/main" xmlns:r="http://schemas.openxmlformats.org/officeDocument/2006/relationships" xmlns:p1510="http://schemas.microsoft.com/office/powerpoint/2015/10/main">
-  <p1510:revLst>
-    <p1510:client id="{6ACE5DF5-C700-420B-BDA8-7B5A660F43CE}" v="55" dt="2022-10-30T00:42:08.773"/>
-    <p1510:client id="{92380F64-76A1-468E-A9CB-B682229AB514}" v="535" dt="2022-10-29T17:44:03.775"/>
-  </p1510:revLst>
-</p1510:revInfo>
-</file>
-
 <file path=ppt/changesInfos/changesInfo1.xml><?xml version="1.0" encoding="utf-8"?>
 <pc:chgInfo xmlns:a="http://schemas.openxmlformats.org/drawingml/2006/main" xmlns:r="http://schemas.openxmlformats.org/officeDocument/2006/relationships" xmlns:ac="http://schemas.microsoft.com/office/drawing/2013/main/command" xmlns:pc="http://schemas.microsoft.com/office/powerpoint/2013/main/command">
   <pc:docChgLst>
     <pc:chgData name="Ricardo Almeida" userId="708f81e4fd72be00" providerId="LiveId" clId="{F7189C19-1CED-43AF-ADAF-8782485EDAB7}"/>
     <pc:docChg chg="undo custSel modSld">
-      <pc:chgData name="Ricardo Almeida" userId="708f81e4fd72be00" providerId="LiveId" clId="{F7189C19-1CED-43AF-ADAF-8782485EDAB7}" dt="2022-10-30T17:14:12.263" v="491" actId="404"/>
+      <pc:chgData name="Ricardo Almeida" userId="708f81e4fd72be00" providerId="LiveId" clId="{F7189C19-1CED-43AF-ADAF-8782485EDAB7}" dt="2022-10-31T20:02:55.452" v="623" actId="20577"/>
       <pc:docMkLst>
         <pc:docMk/>
       </pc:docMkLst>
       <pc:sldChg chg="modSp mod">
-        <pc:chgData name="Ricardo Almeida" userId="708f81e4fd72be00" providerId="LiveId" clId="{F7189C19-1CED-43AF-ADAF-8782485EDAB7}" dt="2022-10-30T17:08:18.617" v="203"/>
+        <pc:chgData name="Ricardo Almeida" userId="708f81e4fd72be00" providerId="LiveId" clId="{F7189C19-1CED-43AF-ADAF-8782485EDAB7}" dt="2022-10-31T20:02:02.233" v="495"/>
         <pc:sldMkLst>
           <pc:docMk/>
           <pc:sldMk cId="2835118317" sldId="265"/>
         </pc:sldMkLst>
         <pc:spChg chg="mod">
-          <ac:chgData name="Ricardo Almeida" userId="708f81e4fd72be00" providerId="LiveId" clId="{F7189C19-1CED-43AF-ADAF-8782485EDAB7}" dt="2022-10-30T17:08:18.617" v="203"/>
+          <ac:chgData name="Ricardo Almeida" userId="708f81e4fd72be00" providerId="LiveId" clId="{F7189C19-1CED-43AF-ADAF-8782485EDAB7}" dt="2022-10-31T20:02:02.233" v="495"/>
           <ac:spMkLst>
             <pc:docMk/>
             <pc:sldMk cId="2835118317" sldId="265"/>
@@ -162,13 +153,13 @@
         </pc:spChg>
       </pc:sldChg>
       <pc:sldChg chg="modSp mod">
-        <pc:chgData name="Ricardo Almeida" userId="708f81e4fd72be00" providerId="LiveId" clId="{F7189C19-1CED-43AF-ADAF-8782485EDAB7}" dt="2022-10-30T17:08:14.550" v="202"/>
+        <pc:chgData name="Ricardo Almeida" userId="708f81e4fd72be00" providerId="LiveId" clId="{F7189C19-1CED-43AF-ADAF-8782485EDAB7}" dt="2022-10-31T20:01:59.351" v="494"/>
         <pc:sldMkLst>
           <pc:docMk/>
           <pc:sldMk cId="2110613621" sldId="266"/>
         </pc:sldMkLst>
         <pc:spChg chg="mod">
-          <ac:chgData name="Ricardo Almeida" userId="708f81e4fd72be00" providerId="LiveId" clId="{F7189C19-1CED-43AF-ADAF-8782485EDAB7}" dt="2022-10-30T17:08:14.550" v="202"/>
+          <ac:chgData name="Ricardo Almeida" userId="708f81e4fd72be00" providerId="LiveId" clId="{F7189C19-1CED-43AF-ADAF-8782485EDAB7}" dt="2022-10-31T20:01:59.351" v="494"/>
           <ac:spMkLst>
             <pc:docMk/>
             <pc:sldMk cId="2110613621" sldId="266"/>
@@ -177,13 +168,13 @@
         </pc:spChg>
       </pc:sldChg>
       <pc:sldChg chg="modSp mod">
-        <pc:chgData name="Ricardo Almeida" userId="708f81e4fd72be00" providerId="LiveId" clId="{F7189C19-1CED-43AF-ADAF-8782485EDAB7}" dt="2022-10-30T17:08:00.584" v="201" actId="20577"/>
+        <pc:chgData name="Ricardo Almeida" userId="708f81e4fd72be00" providerId="LiveId" clId="{F7189C19-1CED-43AF-ADAF-8782485EDAB7}" dt="2022-10-31T20:01:47.604" v="493" actId="20577"/>
         <pc:sldMkLst>
           <pc:docMk/>
           <pc:sldMk cId="2349228486" sldId="267"/>
         </pc:sldMkLst>
         <pc:spChg chg="mod">
-          <ac:chgData name="Ricardo Almeida" userId="708f81e4fd72be00" providerId="LiveId" clId="{F7189C19-1CED-43AF-ADAF-8782485EDAB7}" dt="2022-10-30T17:07:40.703" v="182" actId="6549"/>
+          <ac:chgData name="Ricardo Almeida" userId="708f81e4fd72be00" providerId="LiveId" clId="{F7189C19-1CED-43AF-ADAF-8782485EDAB7}" dt="2022-10-31T20:01:47.604" v="493" actId="20577"/>
           <ac:spMkLst>
             <pc:docMk/>
             <pc:sldMk cId="2349228486" sldId="267"/>
@@ -208,13 +199,13 @@
         </pc:spChg>
       </pc:sldChg>
       <pc:sldChg chg="modSp mod">
-        <pc:chgData name="Ricardo Almeida" userId="708f81e4fd72be00" providerId="LiveId" clId="{F7189C19-1CED-43AF-ADAF-8782485EDAB7}" dt="2022-10-30T17:08:24.216" v="204"/>
+        <pc:chgData name="Ricardo Almeida" userId="708f81e4fd72be00" providerId="LiveId" clId="{F7189C19-1CED-43AF-ADAF-8782485EDAB7}" dt="2022-10-31T20:02:05.834" v="496"/>
         <pc:sldMkLst>
           <pc:docMk/>
           <pc:sldMk cId="122712434" sldId="269"/>
         </pc:sldMkLst>
         <pc:spChg chg="mod">
-          <ac:chgData name="Ricardo Almeida" userId="708f81e4fd72be00" providerId="LiveId" clId="{F7189C19-1CED-43AF-ADAF-8782485EDAB7}" dt="2022-10-30T17:08:24.216" v="204"/>
+          <ac:chgData name="Ricardo Almeida" userId="708f81e4fd72be00" providerId="LiveId" clId="{F7189C19-1CED-43AF-ADAF-8782485EDAB7}" dt="2022-10-31T20:02:05.834" v="496"/>
           <ac:spMkLst>
             <pc:docMk/>
             <pc:sldMk cId="122712434" sldId="269"/>
@@ -282,8 +273,8 @@
           </ac:spMkLst>
         </pc:spChg>
       </pc:sldChg>
-      <pc:sldChg chg="modSp mod">
-        <pc:chgData name="Ricardo Almeida" userId="708f81e4fd72be00" providerId="LiveId" clId="{F7189C19-1CED-43AF-ADAF-8782485EDAB7}" dt="2022-10-30T17:13:22" v="474" actId="20577"/>
+      <pc:sldChg chg="modSp mod modNotesTx">
+        <pc:chgData name="Ricardo Almeida" userId="708f81e4fd72be00" providerId="LiveId" clId="{F7189C19-1CED-43AF-ADAF-8782485EDAB7}" dt="2022-10-31T20:02:55.452" v="623" actId="20577"/>
         <pc:sldMkLst>
           <pc:docMk/>
           <pc:sldMk cId="3402101518" sldId="274"/>
@@ -4282,7 +4273,7 @@
           <a:p>
             <a:fld id="{154FF56E-1437-4972-BD77-AD0994946352}" type="datetimeFigureOut">
               <a:rPr lang="en-GB" smtClean="0"/>
-              <a:t>30/10/2022</a:t>
+              <a:t>31/10/2022</a:t>
             </a:fld>
             <a:endParaRPr lang="en-GB"/>
           </a:p>
@@ -5035,8 +5026,34 @@
           <a:lstStyle/>
           <a:p>
             <a:r>
+              <a:rPr lang="en-US" dirty="0" err="1"/>
+              <a:t>Identificar</a:t>
+            </a:r>
+            <a:r>
               <a:rPr lang="en-US" dirty="0"/>
-              <a:t>1 min 30</a:t>
+              <a:t> key influencers</a:t>
+            </a:r>
+          </a:p>
+          <a:p>
+            <a:r>
+              <a:rPr lang="en-US" dirty="0" err="1"/>
+              <a:t>Segmentar</a:t>
+            </a:r>
+            <a:r>
+              <a:rPr lang="en-US" dirty="0"/>
+              <a:t> o </a:t>
+            </a:r>
+            <a:r>
+              <a:rPr lang="en-US" dirty="0" err="1"/>
+              <a:t>comportamento</a:t>
+            </a:r>
+            <a:r>
+              <a:rPr lang="en-US" dirty="0"/>
+              <a:t> dos </a:t>
+            </a:r>
+            <a:r>
+              <a:rPr lang="en-US"/>
+              <a:t>colaboradores</a:t>
             </a:r>
             <a:endParaRPr lang="en-GB" dirty="0"/>
           </a:p>
@@ -5930,7 +5947,7 @@
           <a:p>
             <a:fld id="{F018D195-D07B-46B0-A3A4-DA90D20B097C}" type="datetime1">
               <a:rPr lang="en-GB" smtClean="0"/>
-              <a:t>30/10/2022</a:t>
+              <a:t>31/10/2022</a:t>
             </a:fld>
             <a:endParaRPr lang="en-GB"/>
           </a:p>
@@ -6134,7 +6151,7 @@
           <a:p>
             <a:fld id="{2A20A686-E6FF-4687-A4FD-83986865BCFC}" type="datetime1">
               <a:rPr lang="en-GB" smtClean="0"/>
-              <a:t>30/10/2022</a:t>
+              <a:t>31/10/2022</a:t>
             </a:fld>
             <a:endParaRPr lang="en-GB"/>
           </a:p>
@@ -6348,7 +6365,7 @@
           <a:p>
             <a:fld id="{3D72C2A6-AF07-46EA-85A8-9827489172DD}" type="datetime1">
               <a:rPr lang="en-GB" smtClean="0"/>
-              <a:t>30/10/2022</a:t>
+              <a:t>31/10/2022</a:t>
             </a:fld>
             <a:endParaRPr lang="en-GB"/>
           </a:p>
@@ -6552,7 +6569,7 @@
           <a:p>
             <a:fld id="{1EDF6478-BAC4-44F2-8173-77CF3FBC047C}" type="datetime1">
               <a:rPr lang="en-GB" smtClean="0"/>
-              <a:t>30/10/2022</a:t>
+              <a:t>31/10/2022</a:t>
             </a:fld>
             <a:endParaRPr lang="en-GB"/>
           </a:p>
@@ -6832,7 +6849,7 @@
           <a:p>
             <a:fld id="{2134E479-88C5-43E4-B172-77A2C574253A}" type="datetime1">
               <a:rPr lang="en-GB" smtClean="0"/>
-              <a:t>30/10/2022</a:t>
+              <a:t>31/10/2022</a:t>
             </a:fld>
             <a:endParaRPr lang="en-GB"/>
           </a:p>
@@ -7104,7 +7121,7 @@
           <a:p>
             <a:fld id="{2A5D0745-43F3-4AFA-AB5A-C6AB0200A9B7}" type="datetime1">
               <a:rPr lang="en-GB" smtClean="0"/>
-              <a:t>30/10/2022</a:t>
+              <a:t>31/10/2022</a:t>
             </a:fld>
             <a:endParaRPr lang="en-GB"/>
           </a:p>
@@ -7523,7 +7540,7 @@
           <a:p>
             <a:fld id="{9CF2253A-01A2-44DA-BAF3-E876CEFCCB7E}" type="datetime1">
               <a:rPr lang="en-GB" smtClean="0"/>
-              <a:t>30/10/2022</a:t>
+              <a:t>31/10/2022</a:t>
             </a:fld>
             <a:endParaRPr lang="en-GB"/>
           </a:p>
@@ -7669,7 +7686,7 @@
           <a:p>
             <a:fld id="{746E8D75-3431-462C-BABC-273DB79CC381}" type="datetime1">
               <a:rPr lang="en-GB" smtClean="0"/>
-              <a:t>30/10/2022</a:t>
+              <a:t>31/10/2022</a:t>
             </a:fld>
             <a:endParaRPr lang="en-GB"/>
           </a:p>
@@ -7786,7 +7803,7 @@
           <a:p>
             <a:fld id="{7BB70D12-4773-413D-A30A-BF6A86FAAF53}" type="datetime1">
               <a:rPr lang="en-GB" smtClean="0"/>
-              <a:t>30/10/2022</a:t>
+              <a:t>31/10/2022</a:t>
             </a:fld>
             <a:endParaRPr lang="en-GB"/>
           </a:p>
@@ -8103,7 +8120,7 @@
           <a:p>
             <a:fld id="{F5C09E71-A36B-4614-814A-55FDDC991947}" type="datetime1">
               <a:rPr lang="en-GB" smtClean="0"/>
-              <a:t>30/10/2022</a:t>
+              <a:t>31/10/2022</a:t>
             </a:fld>
             <a:endParaRPr lang="en-GB"/>
           </a:p>
@@ -8396,7 +8413,7 @@
           <a:p>
             <a:fld id="{6EB4343D-C020-4F86-B18B-5DC7AB076ACF}" type="datetime1">
               <a:rPr lang="en-GB" smtClean="0"/>
-              <a:t>30/10/2022</a:t>
+              <a:t>31/10/2022</a:t>
             </a:fld>
             <a:endParaRPr lang="en-GB"/>
           </a:p>
@@ -8643,7 +8660,7 @@
           <a:p>
             <a:fld id="{468CE42D-7C11-4907-A7B3-02FEB93D8F0A}" type="datetime1">
               <a:rPr lang="en-GB" smtClean="0"/>
-              <a:t>30/10/2022</a:t>
+              <a:t>31/10/2022</a:t>
             </a:fld>
             <a:endParaRPr lang="en-GB"/>
           </a:p>
@@ -9910,7 +9927,7 @@
                 <a:latin typeface="Segoe UI Black" panose="020B0A02040204020203" pitchFamily="34" charset="0"/>
                 <a:ea typeface="Segoe UI Black" panose="020B0A02040204020203" pitchFamily="34" charset="0"/>
               </a:rPr>
-              <a:t>Single Employees, sales reps, and frequen business travellers and over time workers have the highest attrition</a:t>
+              <a:t>Single Employees, sales reps, frequent business travellers and over time workers have the highest attrition</a:t>
             </a:r>
             <a:endParaRPr lang="en-GB" sz="2800" dirty="0">
               <a:latin typeface="Segoe UI Black" panose="020B0A02040204020203" pitchFamily="34" charset="0"/>
@@ -15097,7 +15114,7 @@
                 <a:latin typeface="Segoe UI Black" panose="020B0A02040204020203" pitchFamily="34" charset="0"/>
                 <a:ea typeface="Segoe UI Black" panose="020B0A02040204020203" pitchFamily="34" charset="0"/>
               </a:rPr>
-              <a:t>Single Employees, sales reps, and frequen business travellers and over time workers have the highest attrition</a:t>
+              <a:t>Single Employees, sales reps, frequent business travellers and over time workers have the highest attrition</a:t>
             </a:r>
             <a:endParaRPr lang="en-GB" sz="2800" dirty="0">
               <a:latin typeface="Segoe UI Black" panose="020B0A02040204020203" pitchFamily="34" charset="0"/>
@@ -16810,7 +16827,7 @@
                 <a:latin typeface="Segoe UI Black" panose="020B0A02040204020203" pitchFamily="34" charset="0"/>
                 <a:ea typeface="Segoe UI Black" panose="020B0A02040204020203" pitchFamily="34" charset="0"/>
               </a:rPr>
-              <a:t>Single Employees, sales reps, and frequen business travellers and over time workers have the highest attrition</a:t>
+              <a:t>Single Employees, sales reps, frequent business travellers and over time workers have the highest attrition</a:t>
             </a:r>
             <a:endParaRPr lang="en-GB" sz="2800" dirty="0">
               <a:latin typeface="Segoe UI Black" panose="020B0A02040204020203" pitchFamily="34" charset="0"/>
@@ -17436,7 +17453,7 @@
                 <a:latin typeface="Segoe UI Black" panose="020B0A02040204020203" pitchFamily="34" charset="0"/>
                 <a:ea typeface="Segoe UI Black" panose="020B0A02040204020203" pitchFamily="34" charset="0"/>
               </a:rPr>
-              <a:t>Single Employees, sales reps, and frequen business travellers and over time workers have the highest attrition</a:t>
+              <a:t>Single Employees, sales reps, frequent business travellers and over time workers have the highest attrition</a:t>
             </a:r>
             <a:endParaRPr lang="en-GB" sz="2800" dirty="0">
               <a:latin typeface="Segoe UI Black" panose="020B0A02040204020203" pitchFamily="34" charset="0"/>

</xml_diff>